<commit_message>
Minor change in the PPT
</commit_message>
<xml_diff>
--- a/Azure Virtual Machine 01.pptx
+++ b/Azure Virtual Machine 01.pptx
@@ -4001,11 +4001,11 @@
             </a:pPr>
             <a:r>
               <a:rPr lang="en-US" dirty="0"/>
-              <a:t>Create a </a:t>
-            </a:r>
-            <a:r>
-              <a:rPr lang="en-US"/>
-              <a:t>Windows based VM</a:t>
+              <a:t>Create </a:t>
+            </a:r>
+            <a:r>
+              <a:rPr lang="en-US"/>
+              <a:t>a Windows-based VM</a:t>
             </a:r>
             <a:endParaRPr lang="en-US" dirty="0"/>
           </a:p>

</xml_diff>